<commit_message>
update chart & text placement
</commit_message>
<xml_diff>
--- a/Debak/Templates/Template.pptx
+++ b/Debak/Templates/Template.pptx
@@ -279,7 +279,7 @@
           <a:p>
             <a:fld id="{0DEB214F-0245-4DB9-A768-D685510891C9}" type="datetimeFigureOut">
               <a:rPr lang="en-IN" smtClean="0"/>
-              <a:t>24-06-2025</a:t>
+              <a:t>26-06-2025</a:t>
             </a:fld>
             <a:endParaRPr lang="en-IN"/>
           </a:p>
@@ -506,7 +506,7 @@
           <a:p>
             <a:fld id="{0DEB214F-0245-4DB9-A768-D685510891C9}" type="datetimeFigureOut">
               <a:rPr lang="en-IN" smtClean="0"/>
-              <a:t>24-06-2025</a:t>
+              <a:t>26-06-2025</a:t>
             </a:fld>
             <a:endParaRPr lang="en-IN"/>
           </a:p>
@@ -686,7 +686,7 @@
           <a:p>
             <a:fld id="{0DEB214F-0245-4DB9-A768-D685510891C9}" type="datetimeFigureOut">
               <a:rPr lang="en-IN" smtClean="0"/>
-              <a:t>24-06-2025</a:t>
+              <a:t>26-06-2025</a:t>
             </a:fld>
             <a:endParaRPr lang="en-IN"/>
           </a:p>
@@ -860,7 +860,7 @@
           <a:p>
             <a:fld id="{0DEB214F-0245-4DB9-A768-D685510891C9}" type="datetimeFigureOut">
               <a:rPr lang="en-IN" smtClean="0"/>
-              <a:t>24-06-2025</a:t>
+              <a:t>26-06-2025</a:t>
             </a:fld>
             <a:endParaRPr lang="en-IN"/>
           </a:p>
@@ -1113,7 +1113,7 @@
           <a:p>
             <a:fld id="{0DEB214F-0245-4DB9-A768-D685510891C9}" type="datetimeFigureOut">
               <a:rPr lang="en-IN" smtClean="0"/>
-              <a:t>24-06-2025</a:t>
+              <a:t>26-06-2025</a:t>
             </a:fld>
             <a:endParaRPr lang="en-IN"/>
           </a:p>
@@ -1241,7 +1241,7 @@
         </p:nvSpPr>
         <p:spPr/>
         <p:txBody>
-          <a:bodyPr/>
+          <a:bodyPr anchor="ctr"/>
           <a:lstStyle/>
           <a:p>
             <a:r>
@@ -1263,8 +1263,8 @@
         </p:nvSpPr>
         <p:spPr>
           <a:xfrm>
-            <a:off x="1261872" y="1828800"/>
-            <a:ext cx="4480560" cy="4351337"/>
+            <a:off x="1261871" y="1828800"/>
+            <a:ext cx="4828031" cy="4351337"/>
           </a:xfrm>
         </p:spPr>
         <p:txBody>
@@ -1349,7 +1349,7 @@
         <p:spPr>
           <a:xfrm>
             <a:off x="6126480" y="1828800"/>
-            <a:ext cx="4480560" cy="4351337"/>
+            <a:ext cx="4828032" cy="4351337"/>
           </a:xfrm>
         </p:spPr>
         <p:txBody>
@@ -1438,7 +1438,7 @@
           <a:p>
             <a:fld id="{0DEB214F-0245-4DB9-A768-D685510891C9}" type="datetimeFigureOut">
               <a:rPr lang="en-IN" smtClean="0"/>
-              <a:t>24-06-2025</a:t>
+              <a:t>26-06-2025</a:t>
             </a:fld>
             <a:endParaRPr lang="en-IN"/>
           </a:p>
@@ -1528,7 +1528,7 @@
         </p:nvSpPr>
         <p:spPr/>
         <p:txBody>
-          <a:bodyPr/>
+          <a:bodyPr anchor="ctr"/>
           <a:lstStyle/>
           <a:p>
             <a:r>
@@ -1551,7 +1551,7 @@
         <p:spPr>
           <a:xfrm>
             <a:off x="1261872" y="1713655"/>
-            <a:ext cx="4480560" cy="731520"/>
+            <a:ext cx="4803648" cy="731520"/>
           </a:xfrm>
         </p:spPr>
         <p:txBody>
@@ -1624,8 +1624,8 @@
         </p:nvSpPr>
         <p:spPr>
           <a:xfrm>
-            <a:off x="1261872" y="2507550"/>
-            <a:ext cx="4480560" cy="3664650"/>
+            <a:off x="1261871" y="2507550"/>
+            <a:ext cx="4803649" cy="3664650"/>
           </a:xfrm>
         </p:spPr>
         <p:txBody>
@@ -1662,38 +1662,37 @@
           <a:p>
             <a:pPr lvl="0"/>
             <a:r>
-              <a:rPr lang="en-US"/>
+              <a:rPr lang="en-US" dirty="0"/>
               <a:t>Click to edit Master text styles</a:t>
             </a:r>
           </a:p>
           <a:p>
             <a:pPr lvl="1"/>
             <a:r>
-              <a:rPr lang="en-US"/>
+              <a:rPr lang="en-US" dirty="0"/>
               <a:t>Second level</a:t>
             </a:r>
           </a:p>
           <a:p>
             <a:pPr lvl="2"/>
             <a:r>
-              <a:rPr lang="en-US"/>
+              <a:rPr lang="en-US" dirty="0"/>
               <a:t>Third level</a:t>
             </a:r>
           </a:p>
           <a:p>
             <a:pPr lvl="3"/>
             <a:r>
-              <a:rPr lang="en-US"/>
+              <a:rPr lang="en-US" dirty="0"/>
               <a:t>Fourth level</a:t>
             </a:r>
           </a:p>
           <a:p>
             <a:pPr lvl="4"/>
             <a:r>
-              <a:rPr lang="en-US"/>
+              <a:rPr lang="en-US" dirty="0"/>
               <a:t>Fifth level</a:t>
             </a:r>
-            <a:endParaRPr lang="en-US" dirty="0"/>
           </a:p>
         </p:txBody>
       </p:sp>
@@ -1710,7 +1709,7 @@
         <p:spPr>
           <a:xfrm>
             <a:off x="6126480" y="1713655"/>
-            <a:ext cx="4480560" cy="731520"/>
+            <a:ext cx="4828032" cy="731520"/>
           </a:xfrm>
         </p:spPr>
         <p:txBody>
@@ -1780,7 +1779,7 @@
               <a:buNone/>
             </a:pPr>
             <a:r>
-              <a:rPr lang="en-US"/>
+              <a:rPr lang="en-US" dirty="0"/>
               <a:t>Click to edit Master text styles</a:t>
             </a:r>
           </a:p>
@@ -1799,7 +1798,7 @@
         <p:spPr>
           <a:xfrm>
             <a:off x="6126480" y="2507550"/>
-            <a:ext cx="4480560" cy="3664650"/>
+            <a:ext cx="4828032" cy="3664650"/>
           </a:xfrm>
         </p:spPr>
         <p:txBody>
@@ -1836,38 +1835,37 @@
           <a:p>
             <a:pPr lvl="0"/>
             <a:r>
-              <a:rPr lang="en-US"/>
+              <a:rPr lang="en-US" dirty="0"/>
               <a:t>Click to edit Master text styles</a:t>
             </a:r>
           </a:p>
           <a:p>
             <a:pPr lvl="1"/>
             <a:r>
-              <a:rPr lang="en-US"/>
+              <a:rPr lang="en-US" dirty="0"/>
               <a:t>Second level</a:t>
             </a:r>
           </a:p>
           <a:p>
             <a:pPr lvl="2"/>
             <a:r>
-              <a:rPr lang="en-US"/>
+              <a:rPr lang="en-US" dirty="0"/>
               <a:t>Third level</a:t>
             </a:r>
           </a:p>
           <a:p>
             <a:pPr lvl="3"/>
             <a:r>
-              <a:rPr lang="en-US"/>
+              <a:rPr lang="en-US" dirty="0"/>
               <a:t>Fourth level</a:t>
             </a:r>
           </a:p>
           <a:p>
             <a:pPr lvl="4"/>
             <a:r>
-              <a:rPr lang="en-US"/>
+              <a:rPr lang="en-US" dirty="0"/>
               <a:t>Fifth level</a:t>
             </a:r>
-            <a:endParaRPr lang="en-US" dirty="0"/>
           </a:p>
         </p:txBody>
       </p:sp>
@@ -1888,7 +1886,7 @@
           <a:p>
             <a:fld id="{0DEB214F-0245-4DB9-A768-D685510891C9}" type="datetimeFigureOut">
               <a:rPr lang="en-IN" smtClean="0"/>
-              <a:t>24-06-2025</a:t>
+              <a:t>26-06-2025</a:t>
             </a:fld>
             <a:endParaRPr lang="en-IN"/>
           </a:p>
@@ -2009,7 +2007,7 @@
           <a:p>
             <a:fld id="{0DEB214F-0245-4DB9-A768-D685510891C9}" type="datetimeFigureOut">
               <a:rPr lang="en-IN" smtClean="0"/>
-              <a:t>24-06-2025</a:t>
+              <a:t>26-06-2025</a:t>
             </a:fld>
             <a:endParaRPr lang="en-IN"/>
           </a:p>
@@ -2104,7 +2102,7 @@
           <a:p>
             <a:fld id="{0DEB214F-0245-4DB9-A768-D685510891C9}" type="datetimeFigureOut">
               <a:rPr lang="en-IN" smtClean="0"/>
-              <a:t>24-06-2025</a:t>
+              <a:t>26-06-2025</a:t>
             </a:fld>
             <a:endParaRPr lang="en-IN"/>
           </a:p>
@@ -2389,7 +2387,7 @@
           <a:p>
             <a:fld id="{0DEB214F-0245-4DB9-A768-D685510891C9}" type="datetimeFigureOut">
               <a:rPr lang="en-IN" smtClean="0"/>
-              <a:t>24-06-2025</a:t>
+              <a:t>26-06-2025</a:t>
             </a:fld>
             <a:endParaRPr lang="en-IN"/>
           </a:p>
@@ -2711,7 +2709,7 @@
           <a:p>
             <a:fld id="{0DEB214F-0245-4DB9-A768-D685510891C9}" type="datetimeFigureOut">
               <a:rPr lang="en-IN" smtClean="0"/>
-              <a:t>24-06-2025</a:t>
+              <a:t>26-06-2025</a:t>
             </a:fld>
             <a:endParaRPr lang="en-IN"/>
           </a:p>
@@ -2854,7 +2852,7 @@
           </a:prstGeom>
         </p:spPr>
         <p:txBody>
-          <a:bodyPr vert="horz" lIns="91440" tIns="45720" rIns="91440" bIns="45720" rtlCol="0" anchor="b">
+          <a:bodyPr vert="horz" lIns="91440" tIns="45720" rIns="91440" bIns="45720" rtlCol="0" anchor="ctr">
             <a:normAutofit/>
           </a:bodyPr>
           <a:lstStyle/>
@@ -2879,7 +2877,7 @@
         <p:spPr>
           <a:xfrm>
             <a:off x="1261872" y="1828800"/>
-            <a:ext cx="8595360" cy="4351337"/>
+            <a:ext cx="9692640" cy="4351337"/>
           </a:xfrm>
           <a:prstGeom prst="rect">
             <a:avLst/>
@@ -2963,7 +2961,7 @@
           <a:p>
             <a:fld id="{0DEB214F-0245-4DB9-A768-D685510891C9}" type="datetimeFigureOut">
               <a:rPr lang="en-IN" smtClean="0"/>
-              <a:t>24-06-2025</a:t>
+              <a:t>26-06-2025</a:t>
             </a:fld>
             <a:endParaRPr lang="en-IN"/>
           </a:p>
@@ -3051,7 +3049,7 @@
               <a:rPr lang="en-IN" smtClean="0"/>
               <a:t>‹#›</a:t>
             </a:fld>
-            <a:endParaRPr lang="en-IN"/>
+            <a:endParaRPr lang="en-IN" dirty="0"/>
           </a:p>
         </p:txBody>
       </p:sp>

</xml_diff>